<commit_message>
added f21 moneystream scenario
</commit_message>
<xml_diff>
--- a/com.supeyou.project/doc/UI.elements.pptx
+++ b/com.supeyou.project/doc/UI.elements.pptx
@@ -288,7 +288,7 @@
           <a:p>
             <a:fld id="{06B164E9-F27C-4884-80C1-0A2ECF810731}" type="datetimeFigureOut">
               <a:rPr lang="en-US" smtClean="0"/>
-              <a:t>4/13/2016</a:t>
+              <a:t>4/15/2016</a:t>
             </a:fld>
             <a:endParaRPr lang="en-US"/>
           </a:p>
@@ -458,7 +458,7 @@
           <a:p>
             <a:fld id="{06B164E9-F27C-4884-80C1-0A2ECF810731}" type="datetimeFigureOut">
               <a:rPr lang="en-US" smtClean="0"/>
-              <a:t>4/13/2016</a:t>
+              <a:t>4/15/2016</a:t>
             </a:fld>
             <a:endParaRPr lang="en-US"/>
           </a:p>
@@ -638,7 +638,7 @@
           <a:p>
             <a:fld id="{06B164E9-F27C-4884-80C1-0A2ECF810731}" type="datetimeFigureOut">
               <a:rPr lang="en-US" smtClean="0"/>
-              <a:t>4/13/2016</a:t>
+              <a:t>4/15/2016</a:t>
             </a:fld>
             <a:endParaRPr lang="en-US"/>
           </a:p>
@@ -808,7 +808,7 @@
           <a:p>
             <a:fld id="{06B164E9-F27C-4884-80C1-0A2ECF810731}" type="datetimeFigureOut">
               <a:rPr lang="en-US" smtClean="0"/>
-              <a:t>4/13/2016</a:t>
+              <a:t>4/15/2016</a:t>
             </a:fld>
             <a:endParaRPr lang="en-US"/>
           </a:p>
@@ -1054,7 +1054,7 @@
           <a:p>
             <a:fld id="{06B164E9-F27C-4884-80C1-0A2ECF810731}" type="datetimeFigureOut">
               <a:rPr lang="en-US" smtClean="0"/>
-              <a:t>4/13/2016</a:t>
+              <a:t>4/15/2016</a:t>
             </a:fld>
             <a:endParaRPr lang="en-US"/>
           </a:p>
@@ -1342,7 +1342,7 @@
           <a:p>
             <a:fld id="{06B164E9-F27C-4884-80C1-0A2ECF810731}" type="datetimeFigureOut">
               <a:rPr lang="en-US" smtClean="0"/>
-              <a:t>4/13/2016</a:t>
+              <a:t>4/15/2016</a:t>
             </a:fld>
             <a:endParaRPr lang="en-US"/>
           </a:p>
@@ -1764,7 +1764,7 @@
           <a:p>
             <a:fld id="{06B164E9-F27C-4884-80C1-0A2ECF810731}" type="datetimeFigureOut">
               <a:rPr lang="en-US" smtClean="0"/>
-              <a:t>4/13/2016</a:t>
+              <a:t>4/15/2016</a:t>
             </a:fld>
             <a:endParaRPr lang="en-US"/>
           </a:p>
@@ -1882,7 +1882,7 @@
           <a:p>
             <a:fld id="{06B164E9-F27C-4884-80C1-0A2ECF810731}" type="datetimeFigureOut">
               <a:rPr lang="en-US" smtClean="0"/>
-              <a:t>4/13/2016</a:t>
+              <a:t>4/15/2016</a:t>
             </a:fld>
             <a:endParaRPr lang="en-US"/>
           </a:p>
@@ -1977,7 +1977,7 @@
           <a:p>
             <a:fld id="{06B164E9-F27C-4884-80C1-0A2ECF810731}" type="datetimeFigureOut">
               <a:rPr lang="en-US" smtClean="0"/>
-              <a:t>4/13/2016</a:t>
+              <a:t>4/15/2016</a:t>
             </a:fld>
             <a:endParaRPr lang="en-US"/>
           </a:p>
@@ -2254,7 +2254,7 @@
           <a:p>
             <a:fld id="{06B164E9-F27C-4884-80C1-0A2ECF810731}" type="datetimeFigureOut">
               <a:rPr lang="en-US" smtClean="0"/>
-              <a:t>4/13/2016</a:t>
+              <a:t>4/15/2016</a:t>
             </a:fld>
             <a:endParaRPr lang="en-US"/>
           </a:p>
@@ -2507,7 +2507,7 @@
           <a:p>
             <a:fld id="{06B164E9-F27C-4884-80C1-0A2ECF810731}" type="datetimeFigureOut">
               <a:rPr lang="en-US" smtClean="0"/>
-              <a:t>4/13/2016</a:t>
+              <a:t>4/15/2016</a:t>
             </a:fld>
             <a:endParaRPr lang="en-US"/>
           </a:p>
@@ -2720,7 +2720,7 @@
           <a:p>
             <a:fld id="{06B164E9-F27C-4884-80C1-0A2ECF810731}" type="datetimeFigureOut">
               <a:rPr lang="en-US" smtClean="0"/>
-              <a:t>4/13/2016</a:t>
+              <a:t>4/15/2016</a:t>
             </a:fld>
             <a:endParaRPr lang="en-US"/>
           </a:p>
@@ -3646,6 +3646,257 @@
           </p:txBody>
         </p:sp>
       </p:grpSp>
+      <p:grpSp>
+        <p:nvGrpSpPr>
+          <p:cNvPr id="21" name="Gruppieren 20"/>
+          <p:cNvGrpSpPr/>
+          <p:nvPr/>
+        </p:nvGrpSpPr>
+        <p:grpSpPr>
+          <a:xfrm>
+            <a:off x="1424880" y="3234748"/>
+            <a:ext cx="482824" cy="388504"/>
+            <a:chOff x="4236768" y="1434548"/>
+            <a:chExt cx="482824" cy="388504"/>
+          </a:xfrm>
+        </p:grpSpPr>
+        <p:cxnSp>
+          <p:nvCxnSpPr>
+            <p:cNvPr id="22" name="Gerade Verbindung 21"/>
+            <p:cNvCxnSpPr/>
+            <p:nvPr/>
+          </p:nvCxnSpPr>
+          <p:spPr>
+            <a:xfrm>
+              <a:off x="4478180" y="1628220"/>
+              <a:ext cx="0" cy="194832"/>
+            </a:xfrm>
+            <a:prstGeom prst="line">
+              <a:avLst/>
+            </a:prstGeom>
+            <a:ln>
+              <a:solidFill>
+                <a:srgbClr val="FF0000"/>
+              </a:solidFill>
+              <a:tailEnd type="arrow"/>
+            </a:ln>
+          </p:spPr>
+          <p:style>
+            <a:lnRef idx="1">
+              <a:schemeClr val="accent1"/>
+            </a:lnRef>
+            <a:fillRef idx="0">
+              <a:schemeClr val="accent1"/>
+            </a:fillRef>
+            <a:effectRef idx="0">
+              <a:schemeClr val="accent1"/>
+            </a:effectRef>
+            <a:fontRef idx="minor">
+              <a:schemeClr val="tx1"/>
+            </a:fontRef>
+          </p:style>
+        </p:cxnSp>
+        <p:sp>
+          <p:nvSpPr>
+            <p:cNvPr id="23" name="Textfeld 22"/>
+            <p:cNvSpPr txBox="1"/>
+            <p:nvPr/>
+          </p:nvSpPr>
+          <p:spPr>
+            <a:xfrm>
+              <a:off x="4236768" y="1434548"/>
+              <a:ext cx="482824" cy="215444"/>
+            </a:xfrm>
+            <a:prstGeom prst="rect">
+              <a:avLst/>
+            </a:prstGeom>
+            <a:noFill/>
+          </p:spPr>
+          <p:txBody>
+            <a:bodyPr wrap="none" rtlCol="0">
+              <a:spAutoFit/>
+            </a:bodyPr>
+            <a:lstStyle/>
+            <a:p>
+              <a:r>
+                <a:rPr lang="de-DE" sz="800" dirty="0" smtClean="0">
+                  <a:solidFill>
+                    <a:schemeClr val="bg1">
+                      <a:lumMod val="65000"/>
+                    </a:schemeClr>
+                  </a:solidFill>
+                  <a:latin typeface="Arial" panose="020B0604020202020204" pitchFamily="34" charset="0"/>
+                  <a:cs typeface="Arial" panose="020B0604020202020204" pitchFamily="34" charset="0"/>
+                </a:rPr>
+                <a:t>invited</a:t>
+              </a:r>
+              <a:endParaRPr lang="en-US" sz="800" dirty="0">
+                <a:solidFill>
+                  <a:schemeClr val="bg1">
+                    <a:lumMod val="65000"/>
+                  </a:schemeClr>
+                </a:solidFill>
+                <a:latin typeface="Arial" panose="020B0604020202020204" pitchFamily="34" charset="0"/>
+                <a:cs typeface="Arial" panose="020B0604020202020204" pitchFamily="34" charset="0"/>
+              </a:endParaRPr>
+            </a:p>
+          </p:txBody>
+        </p:sp>
+      </p:grpSp>
+      <p:grpSp>
+        <p:nvGrpSpPr>
+          <p:cNvPr id="1024" name="Gruppieren 1023"/>
+          <p:cNvGrpSpPr/>
+          <p:nvPr/>
+        </p:nvGrpSpPr>
+        <p:grpSpPr>
+          <a:xfrm>
+            <a:off x="1547664" y="2564900"/>
+            <a:ext cx="842864" cy="181709"/>
+            <a:chOff x="971600" y="2399738"/>
+            <a:chExt cx="1611827" cy="381193"/>
+          </a:xfrm>
+        </p:grpSpPr>
+        <p:sp>
+          <p:nvSpPr>
+            <p:cNvPr id="2" name="Rechteck 1"/>
+            <p:cNvSpPr/>
+            <p:nvPr/>
+          </p:nvSpPr>
+          <p:spPr>
+            <a:xfrm>
+              <a:off x="971600" y="2399738"/>
+              <a:ext cx="1611827" cy="381193"/>
+            </a:xfrm>
+            <a:prstGeom prst="rect">
+              <a:avLst/>
+            </a:prstGeom>
+            <a:solidFill>
+              <a:schemeClr val="bg1"/>
+            </a:solidFill>
+            <a:ln>
+              <a:noFill/>
+            </a:ln>
+          </p:spPr>
+          <p:style>
+            <a:lnRef idx="2">
+              <a:schemeClr val="accent1">
+                <a:shade val="50000"/>
+              </a:schemeClr>
+            </a:lnRef>
+            <a:fillRef idx="1">
+              <a:schemeClr val="accent1"/>
+            </a:fillRef>
+            <a:effectRef idx="0">
+              <a:schemeClr val="accent1"/>
+            </a:effectRef>
+            <a:fontRef idx="minor">
+              <a:schemeClr val="lt1"/>
+            </a:fontRef>
+          </p:style>
+          <p:txBody>
+            <a:bodyPr rtlCol="0" anchor="ctr"/>
+            <a:lstStyle/>
+            <a:p>
+              <a:pPr algn="ctr"/>
+              <a:endParaRPr lang="en-US" sz="800" dirty="0">
+                <a:solidFill>
+                  <a:schemeClr val="bg1">
+                    <a:lumMod val="65000"/>
+                  </a:schemeClr>
+                </a:solidFill>
+                <a:latin typeface="Arial" panose="020B0604020202020204" pitchFamily="34" charset="0"/>
+                <a:cs typeface="Arial" panose="020B0604020202020204" pitchFamily="34" charset="0"/>
+              </a:endParaRPr>
+            </a:p>
+          </p:txBody>
+        </p:sp>
+        <p:cxnSp>
+          <p:nvCxnSpPr>
+            <p:cNvPr id="25" name="Gerade Verbindung 24"/>
+            <p:cNvCxnSpPr>
+              <a:stCxn id="2" idx="0"/>
+              <a:endCxn id="2" idx="2"/>
+            </p:cNvCxnSpPr>
+            <p:nvPr/>
+          </p:nvCxnSpPr>
+          <p:spPr>
+            <a:xfrm>
+              <a:off x="1777513" y="2399738"/>
+              <a:ext cx="0" cy="381193"/>
+            </a:xfrm>
+            <a:prstGeom prst="line">
+              <a:avLst/>
+            </a:prstGeom>
+            <a:ln w="12700">
+              <a:solidFill>
+                <a:srgbClr val="FF0000"/>
+              </a:solidFill>
+              <a:tailEnd type="arrow" w="med" len="sm"/>
+            </a:ln>
+          </p:spPr>
+          <p:style>
+            <a:lnRef idx="1">
+              <a:schemeClr val="accent1"/>
+            </a:lnRef>
+            <a:fillRef idx="0">
+              <a:schemeClr val="accent1"/>
+            </a:fillRef>
+            <a:effectRef idx="0">
+              <a:schemeClr val="accent1"/>
+            </a:effectRef>
+            <a:fontRef idx="minor">
+              <a:schemeClr val="tx1"/>
+            </a:fontRef>
+          </p:style>
+        </p:cxnSp>
+        <p:sp>
+          <p:nvSpPr>
+            <p:cNvPr id="30" name="Textfeld 29"/>
+            <p:cNvSpPr txBox="1"/>
+            <p:nvPr/>
+          </p:nvSpPr>
+          <p:spPr>
+            <a:xfrm>
+              <a:off x="1858099" y="2399746"/>
+              <a:ext cx="429163" cy="193698"/>
+            </a:xfrm>
+            <a:prstGeom prst="rect">
+              <a:avLst/>
+            </a:prstGeom>
+            <a:noFill/>
+          </p:spPr>
+          <p:txBody>
+            <a:bodyPr wrap="none" lIns="0" tIns="0" rIns="0" bIns="0" rtlCol="0">
+              <a:spAutoFit/>
+            </a:bodyPr>
+            <a:lstStyle/>
+            <a:p>
+              <a:r>
+                <a:rPr lang="de-DE" sz="600" dirty="0" smtClean="0">
+                  <a:solidFill>
+                    <a:schemeClr val="bg1">
+                      <a:lumMod val="65000"/>
+                    </a:schemeClr>
+                  </a:solidFill>
+                  <a:latin typeface="Arial" panose="020B0604020202020204" pitchFamily="34" charset="0"/>
+                  <a:cs typeface="Arial" panose="020B0604020202020204" pitchFamily="34" charset="0"/>
+                </a:rPr>
+                <a:t>invited</a:t>
+              </a:r>
+              <a:endParaRPr lang="en-US" sz="800" dirty="0">
+                <a:solidFill>
+                  <a:schemeClr val="bg1">
+                    <a:lumMod val="65000"/>
+                  </a:schemeClr>
+                </a:solidFill>
+                <a:latin typeface="Arial" panose="020B0604020202020204" pitchFamily="34" charset="0"/>
+                <a:cs typeface="Arial" panose="020B0604020202020204" pitchFamily="34" charset="0"/>
+              </a:endParaRPr>
+            </a:p>
+          </p:txBody>
+        </p:sp>
+      </p:grpSp>
     </p:spTree>
     <p:extLst>
       <p:ext uri="{BB962C8B-B14F-4D97-AF65-F5344CB8AC3E}">

</xml_diff>